<commit_message>
Redaction Charte de Projet
Redaction de la charte de projet
</commit_message>
<xml_diff>
--- a/Documetation/Rappot d'état (S1).pptx
+++ b/Documetation/Rappot d'état (S1).pptx
@@ -3787,7 +3787,7 @@
                 <a:ea typeface="ＭＳ Ｐゴシック" pitchFamily="-65" charset="-128"/>
                 <a:cs typeface="Arial" charset="0"/>
               </a:rPr>
-              <a:t>Xxx</a:t>
+              <a:t>Cahier de charges (CDC)</a:t>
             </a:r>
           </a:p>
           <a:p>
@@ -3796,13 +3796,75 @@
               <a:buChar char="•"/>
             </a:pPr>
             <a:r>
-              <a:rPr lang="fr-FR" sz="1000" dirty="0" err="1">
+              <a:rPr lang="fr-FR" sz="1000" dirty="0">
                 <a:latin typeface="Arial" charset="0"/>
                 <a:ea typeface="ＭＳ Ｐゴシック" pitchFamily="-65" charset="-128"/>
                 <a:cs typeface="Arial" charset="0"/>
               </a:rPr>
-              <a:t>Yyy</a:t>
-            </a:r>
+              <a:t>Cahier des exigences</a:t>
+            </a:r>
+          </a:p>
+          <a:p>
+            <a:pPr marL="1095375" lvl="2" indent="-180975" algn="l">
+              <a:buFontTx/>
+              <a:buChar char="•"/>
+            </a:pPr>
+            <a:r>
+              <a:rPr lang="fr-FR" sz="1000" dirty="0">
+                <a:latin typeface="Arial" charset="0"/>
+                <a:ea typeface="ＭＳ Ｐゴシック" pitchFamily="-65" charset="-128"/>
+                <a:cs typeface="Arial" charset="0"/>
+              </a:rPr>
+              <a:t>WBS</a:t>
+            </a:r>
+          </a:p>
+          <a:p>
+            <a:pPr marL="1095375" lvl="2" indent="-180975" algn="l">
+              <a:buFontTx/>
+              <a:buChar char="•"/>
+            </a:pPr>
+            <a:r>
+              <a:rPr lang="fr-FR" sz="1000" dirty="0">
+                <a:latin typeface="Arial" charset="0"/>
+                <a:ea typeface="ＭＳ Ｐゴシック" pitchFamily="-65" charset="-128"/>
+                <a:cs typeface="Arial" charset="0"/>
+              </a:rPr>
+              <a:t>Cahier de Validation</a:t>
+            </a:r>
+          </a:p>
+          <a:p>
+            <a:pPr marL="1095375" lvl="2" indent="-180975" algn="l">
+              <a:buFontTx/>
+              <a:buChar char="•"/>
+            </a:pPr>
+            <a:r>
+              <a:rPr lang="fr-FR" sz="1000" dirty="0">
+                <a:latin typeface="Arial" charset="0"/>
+                <a:ea typeface="ＭＳ Ｐゴシック" pitchFamily="-65" charset="-128"/>
+                <a:cs typeface="Arial" charset="0"/>
+              </a:rPr>
+              <a:t>Matrice RASIC</a:t>
+            </a:r>
+          </a:p>
+          <a:p>
+            <a:pPr marL="1095375" lvl="2" indent="-180975" algn="l">
+              <a:buFontTx/>
+              <a:buChar char="•"/>
+            </a:pPr>
+            <a:r>
+              <a:rPr lang="fr-FR" sz="1000" dirty="0">
+                <a:latin typeface="Arial" charset="0"/>
+                <a:ea typeface="ＭＳ Ｐゴシック" pitchFamily="-65" charset="-128"/>
+                <a:cs typeface="Arial" charset="0"/>
+              </a:rPr>
+              <a:t>Charte de projet</a:t>
+            </a:r>
+          </a:p>
+          <a:p>
+            <a:pPr marL="1095375" lvl="2" indent="-180975" algn="l">
+              <a:buFontTx/>
+              <a:buChar char="•"/>
+            </a:pPr>
             <a:endParaRPr lang="fr-FR" sz="1000" dirty="0">
               <a:latin typeface="Arial" charset="0"/>
               <a:ea typeface="ＭＳ Ｐゴシック" pitchFamily="-65" charset="-128"/>
@@ -3834,7 +3896,7 @@
                 <a:ea typeface="ＭＳ Ｐゴシック" pitchFamily="-65" charset="-128"/>
                 <a:cs typeface="Arial" charset="0"/>
               </a:rPr>
-              <a:t>Zzz</a:t>
+              <a:t>02/10/2017</a:t>
             </a:r>
           </a:p>
           <a:p>
@@ -3848,7 +3910,7 @@
                 <a:ea typeface="ＭＳ Ｐゴシック" pitchFamily="-65" charset="-128"/>
                 <a:cs typeface="Arial" charset="0"/>
               </a:rPr>
-              <a:t>Www</a:t>
+              <a:t>19/10/2017</a:t>
             </a:r>
           </a:p>
           <a:p>
@@ -3876,21 +3938,7 @@
                 <a:ea typeface="ＭＳ Ｐゴシック" pitchFamily="-65" charset="-128"/>
                 <a:cs typeface="Arial" charset="0"/>
               </a:rPr>
-              <a:t>…</a:t>
-            </a:r>
-          </a:p>
-          <a:p>
-            <a:pPr marL="1095375" lvl="2" indent="-180975" algn="l">
-              <a:buFontTx/>
-              <a:buChar char="•"/>
-            </a:pPr>
-            <a:r>
-              <a:rPr lang="fr-FR" sz="1000" dirty="0">
-                <a:latin typeface="Arial" charset="0"/>
-                <a:ea typeface="ＭＳ Ｐゴシック" pitchFamily="-65" charset="-128"/>
-                <a:cs typeface="Arial" charset="0"/>
-              </a:rPr>
-              <a:t>…</a:t>
+              <a:t>Découvertes sur ce qui est attendu de nous sur ce projet</a:t>
             </a:r>
           </a:p>
           <a:p>
@@ -3918,21 +3966,7 @@
                 <a:ea typeface="ＭＳ Ｐゴシック" pitchFamily="-65" charset="-128"/>
                 <a:cs typeface="Arial" charset="0"/>
               </a:rPr>
-              <a:t>…</a:t>
-            </a:r>
-          </a:p>
-          <a:p>
-            <a:pPr marL="1095375" lvl="2" indent="-180975" algn="l">
-              <a:buFontTx/>
-              <a:buChar char="•"/>
-            </a:pPr>
-            <a:r>
-              <a:rPr lang="fr-FR" sz="1000" dirty="0">
-                <a:latin typeface="Arial" charset="0"/>
-                <a:ea typeface="ＭＳ Ｐゴシック" pitchFamily="-65" charset="-128"/>
-                <a:cs typeface="Arial" charset="0"/>
-              </a:rPr>
-              <a:t>…</a:t>
+              <a:t>/</a:t>
             </a:r>
           </a:p>
         </p:txBody>
@@ -4095,11 +4129,20 @@
               <a:buFontTx/>
               <a:buChar char="•"/>
             </a:pPr>
+            <a:endParaRPr lang="fr-FR" sz="1000" dirty="0">
+              <a:latin typeface="Arial" charset="0"/>
+            </a:endParaRPr>
+          </a:p>
+          <a:p>
+            <a:pPr marL="652463" lvl="1" indent="-195263" algn="l">
+              <a:buFontTx/>
+              <a:buChar char="•"/>
+            </a:pPr>
             <a:r>
               <a:rPr lang="fr-FR" sz="1000" dirty="0">
                 <a:latin typeface="Arial" charset="0"/>
               </a:rPr>
-              <a:t>RAF de ce qui n’a pas été fait et qui aurait dû être fait au cours de la période écoulée précédente</a:t>
+              <a:t>Commencement de la réalisation pratique du projet</a:t>
             </a:r>
           </a:p>
           <a:p>
@@ -4107,21 +4150,45 @@
               <a:buFontTx/>
               <a:buChar char="•"/>
             </a:pPr>
+            <a:r>
+              <a:rPr lang="fr-FR" sz="1000" dirty="0">
+                <a:latin typeface="Arial" charset="0"/>
+              </a:rPr>
+              <a:t>Création de la BDD sous linux</a:t>
+            </a:r>
+          </a:p>
+          <a:p>
+            <a:pPr marL="652463" lvl="1" indent="-195263" algn="l">
+              <a:buFontTx/>
+              <a:buChar char="•"/>
+            </a:pPr>
+            <a:r>
+              <a:rPr lang="fr-FR" sz="1000" dirty="0">
+                <a:latin typeface="Arial" charset="0"/>
+              </a:rPr>
+              <a:t>Insertions des films dans la BDD</a:t>
+            </a:r>
+          </a:p>
+          <a:p>
+            <a:pPr marL="652463" lvl="1" indent="-195263" algn="l">
+              <a:buFontTx/>
+              <a:buChar char="•"/>
+            </a:pPr>
+            <a:r>
+              <a:rPr lang="fr-FR" sz="1000" dirty="0">
+                <a:latin typeface="Arial" charset="0"/>
+              </a:rPr>
+              <a:t>Ajout des synopsis</a:t>
+            </a:r>
+          </a:p>
+          <a:p>
+            <a:pPr marL="195263" indent="-195263" algn="l">
+              <a:buFontTx/>
+              <a:buChar char="•"/>
+            </a:pPr>
             <a:endParaRPr lang="fr-FR" sz="1000" dirty="0">
               <a:latin typeface="Arial" charset="0"/>
             </a:endParaRPr>
-          </a:p>
-          <a:p>
-            <a:pPr marL="652463" lvl="1" indent="-195263" algn="l">
-              <a:buFontTx/>
-              <a:buChar char="•"/>
-            </a:pPr>
-            <a:r>
-              <a:rPr lang="fr-FR" sz="1000" dirty="0">
-                <a:latin typeface="Arial" charset="0"/>
-              </a:rPr>
-              <a:t>RAF pour la période suivante</a:t>
-            </a:r>
           </a:p>
           <a:p>
             <a:pPr marL="195263" indent="-195263" algn="l"/>
@@ -4220,17 +4287,14 @@
           <a:bodyPr/>
           <a:lstStyle/>
           <a:p>
-            <a:pPr marL="195263" indent="-195263" algn="l">
-              <a:buFontTx/>
-              <a:buChar char="•"/>
-            </a:pPr>
+            <a:pPr algn="l"/>
             <a:r>
               <a:rPr lang="fr-FR" sz="1000" dirty="0">
                 <a:latin typeface="Arial" charset="0"/>
                 <a:ea typeface="ＭＳ Ｐゴシック" pitchFamily="-65" charset="-128"/>
                 <a:cs typeface="Arial" charset="0"/>
               </a:rPr>
-              <a:t>Indiquer ici tous les points critiques que vous souhaiteriez remonter au Comité de Pilotage afin d’exercer votre devoir l’alerte : points qui nécessitent une action/décision/avis du COPIL</a:t>
+              <a:t>Rien à faire remonter</a:t>
             </a:r>
           </a:p>
         </p:txBody>
@@ -4245,7 +4309,7 @@
         </p:nvSpPr>
         <p:spPr bwMode="auto">
           <a:xfrm>
-            <a:off x="4627563" y="3716338"/>
+            <a:off x="4668838" y="3753644"/>
             <a:ext cx="4279900" cy="1296987"/>
           </a:xfrm>
           <a:prstGeom prst="roundRect">
@@ -4274,7 +4338,7 @@
               <a:rPr lang="fr-FR" sz="1000" dirty="0">
                 <a:latin typeface="Arial" charset="0"/>
               </a:rPr>
-              <a:t>Prises: </a:t>
+              <a:t>Prises : </a:t>
             </a:r>
           </a:p>
           <a:p>
@@ -4286,7 +4350,7 @@
               <a:rPr lang="fr-FR" sz="1000" dirty="0">
                 <a:latin typeface="Arial" charset="0"/>
               </a:rPr>
-              <a:t>Indiquer ici les décisions prises ayant un impact sur la suite du projet</a:t>
+              <a:t>Le projet sera réalisé sous Linux</a:t>
             </a:r>
           </a:p>
           <a:p>
@@ -4294,6 +4358,18 @@
               <a:buFontTx/>
               <a:buChar char="•"/>
             </a:pPr>
+            <a:r>
+              <a:rPr lang="fr-FR" sz="1000" dirty="0">
+                <a:latin typeface="Arial" charset="0"/>
+              </a:rPr>
+              <a:t>Le langage utilisé sera le langage SQL</a:t>
+            </a:r>
+          </a:p>
+          <a:p>
+            <a:pPr marL="195263" indent="-195263" algn="l">
+              <a:buFontTx/>
+              <a:buChar char="•"/>
+            </a:pPr>
             <a:endParaRPr lang="fr-FR" sz="1000" dirty="0">
               <a:latin typeface="Arial" charset="0"/>
             </a:endParaRPr>
@@ -4304,19 +4380,19 @@
               <a:rPr lang="fr-FR" sz="1000" dirty="0">
                 <a:latin typeface="Arial" charset="0"/>
               </a:rPr>
-              <a:t>En attente:</a:t>
+              <a:t>En attente :</a:t>
             </a:r>
           </a:p>
           <a:p>
             <a:pPr marL="195263" indent="-195263" algn="l">
-              <a:buFontTx/>
+              <a:buFont typeface="Arial" panose="020B0604020202020204" pitchFamily="34" charset="0"/>
               <a:buChar char="•"/>
             </a:pPr>
             <a:r>
               <a:rPr lang="fr-FR" sz="1000" dirty="0">
                 <a:latin typeface="Arial" charset="0"/>
               </a:rPr>
-              <a:t>Indiquer ici les décisions en attente</a:t>
+              <a:t>/</a:t>
             </a:r>
           </a:p>
           <a:p>
@@ -4580,59 +4656,8 @@
         </p:nvSpPr>
         <p:spPr bwMode="auto">
           <a:xfrm>
-            <a:off x="4968910" y="-453888"/>
+            <a:off x="7843290" y="175418"/>
             <a:ext cx="441325" cy="457201"/>
-          </a:xfrm>
-          <a:prstGeom prst="rect">
-            <a:avLst/>
-          </a:prstGeom>
-          <a:noFill/>
-          <a:ln w="9525">
-            <a:noFill/>
-            <a:miter lim="800000"/>
-            <a:headEnd/>
-            <a:tailEnd/>
-          </a:ln>
-        </p:spPr>
-        <p:txBody>
-          <a:bodyPr wrap="none">
-            <a:spAutoFit/>
-          </a:bodyPr>
-          <a:lstStyle/>
-          <a:p>
-            <a:pPr algn="l" eaLnBrk="1" hangingPunct="1">
-              <a:spcBef>
-                <a:spcPct val="50000"/>
-              </a:spcBef>
-              <a:buFont typeface="Wingdings" pitchFamily="2" charset="2"/>
-              <a:buNone/>
-            </a:pPr>
-            <a:r>
-              <a:rPr lang="fr-FR" sz="2400" b="1" dirty="0">
-                <a:solidFill>
-                  <a:srgbClr val="00FF00"/>
-                </a:solidFill>
-                <a:latin typeface="Arial" charset="0"/>
-                <a:ea typeface="ＭＳ Ｐゴシック" pitchFamily="-65" charset="-128"/>
-                <a:sym typeface="Wingdings" pitchFamily="2" charset="2"/>
-              </a:rPr>
-              <a:t></a:t>
-            </a:r>
-          </a:p>
-        </p:txBody>
-      </p:sp>
-      <p:sp>
-        <p:nvSpPr>
-          <p:cNvPr id="3087" name="Rectangle 18"/>
-          <p:cNvSpPr>
-            <a:spLocks noChangeArrowheads="1"/>
-          </p:cNvSpPr>
-          <p:nvPr/>
-        </p:nvSpPr>
-        <p:spPr bwMode="auto">
-          <a:xfrm>
-            <a:off x="7875091" y="163488"/>
-            <a:ext cx="441325" cy="457200"/>
           </a:xfrm>
           <a:prstGeom prst="rect">
             <a:avLst/>
@@ -4704,7 +4729,7 @@
           <a:p>
             <a:pPr algn="l"/>
             <a:r>
-              <a:rPr lang="fr-FR" sz="2400" b="1">
+              <a:rPr lang="fr-FR" sz="2400" b="1" dirty="0">
                 <a:solidFill>
                   <a:srgbClr val="FF9900"/>
                 </a:solidFill>
@@ -4865,35 +4890,7 @@
                 <a:ea typeface="ＭＳ Ｐゴシック" pitchFamily="-65" charset="-128"/>
                 <a:cs typeface="Arial" charset="0"/>
               </a:rPr>
-              <a:t>Risques apparus et parades mises en œuvres</a:t>
-            </a:r>
-          </a:p>
-          <a:p>
-            <a:pPr marL="652463" lvl="1" indent="-195263" algn="l">
-              <a:buFontTx/>
-              <a:buChar char="•"/>
-            </a:pPr>
-            <a:r>
-              <a:rPr lang="fr-FR" sz="1000" dirty="0">
-                <a:latin typeface="Arial" charset="0"/>
-                <a:ea typeface="ＭＳ Ｐゴシック" pitchFamily="-65" charset="-128"/>
-                <a:cs typeface="Arial" charset="0"/>
-              </a:rPr>
-              <a:t>Risques qui peuvent encore apparaître (risques latents)</a:t>
-            </a:r>
-          </a:p>
-          <a:p>
-            <a:pPr marL="652463" lvl="1" indent="-195263" algn="l">
-              <a:buFontTx/>
-              <a:buChar char="•"/>
-            </a:pPr>
-            <a:r>
-              <a:rPr lang="fr-FR" sz="1000" dirty="0">
-                <a:latin typeface="Arial" charset="0"/>
-                <a:ea typeface="ＭＳ Ｐゴシック" pitchFamily="-65" charset="-128"/>
-                <a:cs typeface="Arial" charset="0"/>
-              </a:rPr>
-              <a:t>Risques qui ne peuvent plus apparaître (risques disparus)</a:t>
+              <a:t>Aucuns risques apparus pour le moment</a:t>
             </a:r>
           </a:p>
         </p:txBody>

</xml_diff>